<commit_message>
[MT] Chap1 - Figures
</commit_message>
<xml_diff>
--- a/figures/ch1/codon_table.pptx
+++ b/figures/ch1/codon_table.pptx
@@ -288,7 +288,7 @@
           <a:p>
             <a:fld id="{60BEE245-2747-1C4A-B2AC-904DF698C7AA}" type="datetimeFigureOut">
               <a:rPr lang="en-US" smtClean="0"/>
-              <a:t>27/08/15</a:t>
+              <a:t>21/09/15</a:t>
             </a:fld>
             <a:endParaRPr lang="en-US"/>
           </a:p>
@@ -458,7 +458,7 @@
           <a:p>
             <a:fld id="{60BEE245-2747-1C4A-B2AC-904DF698C7AA}" type="datetimeFigureOut">
               <a:rPr lang="en-US" smtClean="0"/>
-              <a:t>27/08/15</a:t>
+              <a:t>21/09/15</a:t>
             </a:fld>
             <a:endParaRPr lang="en-US"/>
           </a:p>
@@ -638,7 +638,7 @@
           <a:p>
             <a:fld id="{60BEE245-2747-1C4A-B2AC-904DF698C7AA}" type="datetimeFigureOut">
               <a:rPr lang="en-US" smtClean="0"/>
-              <a:t>27/08/15</a:t>
+              <a:t>21/09/15</a:t>
             </a:fld>
             <a:endParaRPr lang="en-US"/>
           </a:p>
@@ -808,7 +808,7 @@
           <a:p>
             <a:fld id="{60BEE245-2747-1C4A-B2AC-904DF698C7AA}" type="datetimeFigureOut">
               <a:rPr lang="en-US" smtClean="0"/>
-              <a:t>27/08/15</a:t>
+              <a:t>21/09/15</a:t>
             </a:fld>
             <a:endParaRPr lang="en-US"/>
           </a:p>
@@ -1054,7 +1054,7 @@
           <a:p>
             <a:fld id="{60BEE245-2747-1C4A-B2AC-904DF698C7AA}" type="datetimeFigureOut">
               <a:rPr lang="en-US" smtClean="0"/>
-              <a:t>27/08/15</a:t>
+              <a:t>21/09/15</a:t>
             </a:fld>
             <a:endParaRPr lang="en-US"/>
           </a:p>
@@ -1342,7 +1342,7 @@
           <a:p>
             <a:fld id="{60BEE245-2747-1C4A-B2AC-904DF698C7AA}" type="datetimeFigureOut">
               <a:rPr lang="en-US" smtClean="0"/>
-              <a:t>27/08/15</a:t>
+              <a:t>21/09/15</a:t>
             </a:fld>
             <a:endParaRPr lang="en-US"/>
           </a:p>
@@ -1764,7 +1764,7 @@
           <a:p>
             <a:fld id="{60BEE245-2747-1C4A-B2AC-904DF698C7AA}" type="datetimeFigureOut">
               <a:rPr lang="en-US" smtClean="0"/>
-              <a:t>27/08/15</a:t>
+              <a:t>21/09/15</a:t>
             </a:fld>
             <a:endParaRPr lang="en-US"/>
           </a:p>
@@ -1882,7 +1882,7 @@
           <a:p>
             <a:fld id="{60BEE245-2747-1C4A-B2AC-904DF698C7AA}" type="datetimeFigureOut">
               <a:rPr lang="en-US" smtClean="0"/>
-              <a:t>27/08/15</a:t>
+              <a:t>21/09/15</a:t>
             </a:fld>
             <a:endParaRPr lang="en-US"/>
           </a:p>
@@ -1977,7 +1977,7 @@
           <a:p>
             <a:fld id="{60BEE245-2747-1C4A-B2AC-904DF698C7AA}" type="datetimeFigureOut">
               <a:rPr lang="en-US" smtClean="0"/>
-              <a:t>27/08/15</a:t>
+              <a:t>21/09/15</a:t>
             </a:fld>
             <a:endParaRPr lang="en-US"/>
           </a:p>
@@ -2254,7 +2254,7 @@
           <a:p>
             <a:fld id="{60BEE245-2747-1C4A-B2AC-904DF698C7AA}" type="datetimeFigureOut">
               <a:rPr lang="en-US" smtClean="0"/>
-              <a:t>27/08/15</a:t>
+              <a:t>21/09/15</a:t>
             </a:fld>
             <a:endParaRPr lang="en-US"/>
           </a:p>
@@ -2507,7 +2507,7 @@
           <a:p>
             <a:fld id="{60BEE245-2747-1C4A-B2AC-904DF698C7AA}" type="datetimeFigureOut">
               <a:rPr lang="en-US" smtClean="0"/>
-              <a:t>27/08/15</a:t>
+              <a:t>21/09/15</a:t>
             </a:fld>
             <a:endParaRPr lang="en-US"/>
           </a:p>
@@ -2720,7 +2720,7 @@
           <a:p>
             <a:fld id="{60BEE245-2747-1C4A-B2AC-904DF698C7AA}" type="datetimeFigureOut">
               <a:rPr lang="en-US" smtClean="0"/>
-              <a:t>27/08/15</a:t>
+              <a:t>21/09/15</a:t>
             </a:fld>
             <a:endParaRPr lang="en-US"/>
           </a:p>
@@ -3104,7 +3104,7 @@
           <p:nvPr>
             <p:extLst>
               <p:ext uri="{D42A27DB-BD31-4B8C-83A1-F6EECF244321}">
-                <p14:modId xmlns:p14="http://schemas.microsoft.com/office/powerpoint/2010/main" val="1546152429"/>
+                <p14:modId xmlns:p14="http://schemas.microsoft.com/office/powerpoint/2010/main" val="28343459"/>
               </p:ext>
             </p:extLst>
           </p:nvPr>
@@ -3185,6 +3185,9 @@
                       <a:headEnd type="none" w="med" len="med"/>
                       <a:tailEnd type="none" w="med" len="med"/>
                     </a:lnB>
+                    <a:solidFill>
+                      <a:srgbClr val="BFBFBF"/>
+                    </a:solidFill>
                   </a:tcPr>
                 </a:tc>
                 <a:tc gridSpan="8">
@@ -3242,6 +3245,9 @@
                       <a:headEnd type="none" w="med" len="med"/>
                       <a:tailEnd type="none" w="med" len="med"/>
                     </a:lnB>
+                    <a:solidFill>
+                      <a:srgbClr val="BFBFBF"/>
+                    </a:solidFill>
                   </a:tcPr>
                 </a:tc>
                 <a:tc hMerge="1">
@@ -3321,7 +3327,7 @@
                     <a:p>
                       <a:pPr algn="ctr" fontAlgn="b"/>
                       <a:r>
-                        <a:rPr lang="en-US" sz="1100" b="1" i="0" u="none" strike="noStrike">
+                        <a:rPr lang="en-US" sz="1100" b="1" i="0" u="none" strike="noStrike" dirty="0">
                           <a:solidFill>
                             <a:srgbClr val="000000"/>
                           </a:solidFill>
@@ -3369,6 +3375,9 @@
                       <a:headEnd type="none" w="med" len="med"/>
                       <a:tailEnd type="none" w="med" len="med"/>
                     </a:lnB>
+                    <a:solidFill>
+                      <a:srgbClr val="BFBFBF"/>
+                    </a:solidFill>
                   </a:tcPr>
                 </a:tc>
               </a:tr>
@@ -3438,6 +3447,9 @@
                       <a:headEnd type="none" w="med" len="med"/>
                       <a:tailEnd type="none" w="med" len="med"/>
                     </a:lnB>
+                    <a:solidFill>
+                      <a:srgbClr val="BFBFBF"/>
+                    </a:solidFill>
                   </a:tcPr>
                 </a:tc>
                 <a:tc hMerge="1">
@@ -3505,6 +3517,9 @@
                       <a:headEnd type="none" w="med" len="med"/>
                       <a:tailEnd type="none" w="med" len="med"/>
                     </a:lnB>
+                    <a:solidFill>
+                      <a:srgbClr val="BFBFBF"/>
+                    </a:solidFill>
                   </a:tcPr>
                 </a:tc>
                 <a:tc hMerge="1">
@@ -3572,6 +3587,9 @@
                       <a:headEnd type="none" w="med" len="med"/>
                       <a:tailEnd type="none" w="med" len="med"/>
                     </a:lnB>
+                    <a:solidFill>
+                      <a:srgbClr val="BFBFBF"/>
+                    </a:solidFill>
                   </a:tcPr>
                 </a:tc>
                 <a:tc hMerge="1">
@@ -3591,7 +3609,7 @@
                     <a:p>
                       <a:pPr algn="ctr" fontAlgn="b"/>
                       <a:r>
-                        <a:rPr lang="en-US" sz="1100" b="1" i="0" u="none" strike="noStrike">
+                        <a:rPr lang="en-US" sz="1100" b="1" i="0" u="none" strike="noStrike" dirty="0">
                           <a:solidFill>
                             <a:srgbClr val="000000"/>
                           </a:solidFill>
@@ -3639,6 +3657,9 @@
                       <a:headEnd type="none" w="med" len="med"/>
                       <a:tailEnd type="none" w="med" len="med"/>
                     </a:lnB>
+                    <a:solidFill>
+                      <a:srgbClr val="BFBFBF"/>
+                    </a:solidFill>
                   </a:tcPr>
                 </a:tc>
                 <a:tc hMerge="1">
@@ -3718,6 +3739,11 @@
                       <a:headEnd type="none" w="med" len="med"/>
                       <a:tailEnd type="none" w="med" len="med"/>
                     </a:lnB>
+                    <a:solidFill>
+                      <a:schemeClr val="bg1">
+                        <a:lumMod val="75000"/>
+                      </a:schemeClr>
+                    </a:solidFill>
                   </a:tcPr>
                 </a:tc>
                 <a:tc>
@@ -4183,6 +4209,9 @@
                       <a:headEnd type="none" w="med" len="med"/>
                       <a:tailEnd type="none" w="med" len="med"/>
                     </a:lnB>
+                    <a:solidFill>
+                      <a:srgbClr val="BFBFBF"/>
+                    </a:solidFill>
                   </a:tcPr>
                 </a:tc>
               </a:tr>
@@ -4660,6 +4689,9 @@
                       <a:headEnd type="none" w="med" len="med"/>
                       <a:tailEnd type="none" w="med" len="med"/>
                     </a:lnB>
+                    <a:solidFill>
+                      <a:srgbClr val="BFBFBF"/>
+                    </a:solidFill>
                   </a:tcPr>
                 </a:tc>
               </a:tr>
@@ -5137,6 +5169,9 @@
                       <a:headEnd type="none" w="med" len="med"/>
                       <a:tailEnd type="none" w="med" len="med"/>
                     </a:lnB>
+                    <a:solidFill>
+                      <a:srgbClr val="BFBFBF"/>
+                    </a:solidFill>
                   </a:tcPr>
                 </a:tc>
               </a:tr>
@@ -5614,6 +5649,9 @@
                       <a:headEnd type="none" w="med" len="med"/>
                       <a:tailEnd type="none" w="med" len="med"/>
                     </a:lnB>
+                    <a:solidFill>
+                      <a:srgbClr val="BFBFBF"/>
+                    </a:solidFill>
                   </a:tcPr>
                 </a:tc>
               </a:tr>
@@ -5673,6 +5711,11 @@
                       <a:headEnd type="none" w="med" len="med"/>
                       <a:tailEnd type="none" w="med" len="med"/>
                     </a:lnB>
+                    <a:solidFill>
+                      <a:schemeClr val="bg1">
+                        <a:lumMod val="75000"/>
+                      </a:schemeClr>
+                    </a:solidFill>
                   </a:tcPr>
                 </a:tc>
                 <a:tc>
@@ -6138,6 +6181,9 @@
                       <a:headEnd type="none" w="med" len="med"/>
                       <a:tailEnd type="none" w="med" len="med"/>
                     </a:lnB>
+                    <a:solidFill>
+                      <a:srgbClr val="BFBFBF"/>
+                    </a:solidFill>
                   </a:tcPr>
                 </a:tc>
               </a:tr>
@@ -6615,6 +6661,9 @@
                       <a:headEnd type="none" w="med" len="med"/>
                       <a:tailEnd type="none" w="med" len="med"/>
                     </a:lnB>
+                    <a:solidFill>
+                      <a:srgbClr val="BFBFBF"/>
+                    </a:solidFill>
                   </a:tcPr>
                 </a:tc>
               </a:tr>
@@ -7092,6 +7141,9 @@
                       <a:headEnd type="none" w="med" len="med"/>
                       <a:tailEnd type="none" w="med" len="med"/>
                     </a:lnB>
+                    <a:solidFill>
+                      <a:srgbClr val="BFBFBF"/>
+                    </a:solidFill>
                   </a:tcPr>
                 </a:tc>
               </a:tr>
@@ -7569,6 +7621,9 @@
                       <a:headEnd type="none" w="med" len="med"/>
                       <a:tailEnd type="none" w="med" len="med"/>
                     </a:lnB>
+                    <a:solidFill>
+                      <a:srgbClr val="BFBFBF"/>
+                    </a:solidFill>
                   </a:tcPr>
                 </a:tc>
               </a:tr>
@@ -7628,6 +7683,11 @@
                       <a:headEnd type="none" w="med" len="med"/>
                       <a:tailEnd type="none" w="med" len="med"/>
                     </a:lnB>
+                    <a:solidFill>
+                      <a:schemeClr val="bg1">
+                        <a:lumMod val="75000"/>
+                      </a:schemeClr>
+                    </a:solidFill>
                   </a:tcPr>
                 </a:tc>
                 <a:tc>
@@ -8093,6 +8153,9 @@
                       <a:headEnd type="none" w="med" len="med"/>
                       <a:tailEnd type="none" w="med" len="med"/>
                     </a:lnB>
+                    <a:solidFill>
+                      <a:srgbClr val="BFBFBF"/>
+                    </a:solidFill>
                   </a:tcPr>
                 </a:tc>
               </a:tr>
@@ -8570,6 +8633,9 @@
                       <a:headEnd type="none" w="med" len="med"/>
                       <a:tailEnd type="none" w="med" len="med"/>
                     </a:lnB>
+                    <a:solidFill>
+                      <a:srgbClr val="BFBFBF"/>
+                    </a:solidFill>
                   </a:tcPr>
                 </a:tc>
               </a:tr>
@@ -9047,6 +9113,9 @@
                       <a:headEnd type="none" w="med" len="med"/>
                       <a:tailEnd type="none" w="med" len="med"/>
                     </a:lnB>
+                    <a:solidFill>
+                      <a:srgbClr val="BFBFBF"/>
+                    </a:solidFill>
                   </a:tcPr>
                 </a:tc>
               </a:tr>
@@ -9524,6 +9593,9 @@
                       <a:headEnd type="none" w="med" len="med"/>
                       <a:tailEnd type="none" w="med" len="med"/>
                     </a:lnB>
+                    <a:solidFill>
+                      <a:srgbClr val="BFBFBF"/>
+                    </a:solidFill>
                   </a:tcPr>
                 </a:tc>
               </a:tr>
@@ -9535,7 +9607,7 @@
                     <a:p>
                       <a:pPr algn="ctr" fontAlgn="ctr"/>
                       <a:r>
-                        <a:rPr lang="en-US" sz="1100" b="1" i="0" u="none" strike="noStrike">
+                        <a:rPr lang="en-US" sz="1100" b="1" i="0" u="none" strike="noStrike" dirty="0">
                           <a:solidFill>
                             <a:srgbClr val="000000"/>
                           </a:solidFill>
@@ -9583,6 +9655,11 @@
                       <a:headEnd type="none" w="med" len="med"/>
                       <a:tailEnd type="none" w="med" len="med"/>
                     </a:lnB>
+                    <a:solidFill>
+                      <a:schemeClr val="bg1">
+                        <a:lumMod val="75000"/>
+                      </a:schemeClr>
+                    </a:solidFill>
                   </a:tcPr>
                 </a:tc>
                 <a:tc>
@@ -10048,6 +10125,9 @@
                       <a:headEnd type="none" w="med" len="med"/>
                       <a:tailEnd type="none" w="med" len="med"/>
                     </a:lnB>
+                    <a:solidFill>
+                      <a:srgbClr val="BFBFBF"/>
+                    </a:solidFill>
                   </a:tcPr>
                 </a:tc>
               </a:tr>
@@ -10525,6 +10605,9 @@
                       <a:headEnd type="none" w="med" len="med"/>
                       <a:tailEnd type="none" w="med" len="med"/>
                     </a:lnB>
+                    <a:solidFill>
+                      <a:srgbClr val="BFBFBF"/>
+                    </a:solidFill>
                   </a:tcPr>
                 </a:tc>
               </a:tr>
@@ -11002,6 +11085,9 @@
                       <a:headEnd type="none" w="med" len="med"/>
                       <a:tailEnd type="none" w="med" len="med"/>
                     </a:lnB>
+                    <a:solidFill>
+                      <a:srgbClr val="BFBFBF"/>
+                    </a:solidFill>
                   </a:tcPr>
                 </a:tc>
               </a:tr>
@@ -11479,6 +11565,9 @@
                       <a:headEnd type="none" w="med" len="med"/>
                       <a:tailEnd type="none" w="med" len="med"/>
                     </a:lnB>
+                    <a:solidFill>
+                      <a:srgbClr val="BFBFBF"/>
+                    </a:solidFill>
                   </a:tcPr>
                 </a:tc>
               </a:tr>

</xml_diff>